<commit_message>
design: Create pre-feedback Tableau story and document design choices
</commit_message>
<xml_diff>
--- a/Viz_Storyboard.pptx
+++ b/Viz_Storyboard.pptx
@@ -5,7 +5,7 @@
     <p:sldMasterId id="2147483648" r:id="rId1"/>
   </p:sldMasterIdLst>
   <p:notesMasterIdLst>
-    <p:notesMasterId r:id="rId8"/>
+    <p:notesMasterId r:id="rId7"/>
   </p:notesMasterIdLst>
   <p:sldIdLst>
     <p:sldId id="262" r:id="rId2"/>
@@ -13,7 +13,6 @@
     <p:sldId id="258" r:id="rId4"/>
     <p:sldId id="259" r:id="rId5"/>
     <p:sldId id="260" r:id="rId6"/>
-    <p:sldId id="261" r:id="rId7"/>
   </p:sldIdLst>
   <p:sldSz cx="12192000" cy="6858000"/>
   <p:notesSz cx="6858000" cy="9144000"/>
@@ -513,38 +512,13 @@
           <a:bodyPr/>
           <a:lstStyle/>
           <a:p>
-            <a:pPr marL="0" marR="0" lvl="0" indent="0" algn="l" defTabSz="914400" rtl="0" eaLnBrk="1" fontAlgn="auto" latinLnBrk="0" hangingPunct="1">
-              <a:lnSpc>
-                <a:spcPct val="100000"/>
-              </a:lnSpc>
-              <a:spcBef>
-                <a:spcPts val="0"/>
-              </a:spcBef>
-              <a:spcAft>
-                <a:spcPts val="0"/>
-              </a:spcAft>
-              <a:buClrTx/>
-              <a:buSzTx/>
-              <a:buFontTx/>
-              <a:buNone/>
-              <a:tabLst/>
-              <a:defRPr/>
-            </a:pPr>
+            <a:r>
+              <a:rPr lang="en-US"/>
+              <a:t>We </a:t>
+            </a:r>
             <a:r>
               <a:rPr lang="en-US" dirty="0"/>
-              <a:t>AGG STRATEGY: COUNT by EDR year</a:t>
-            </a:r>
-          </a:p>
-          <a:p>
-            <a:endParaRPr lang="en-US" dirty="0"/>
-          </a:p>
-          <a:p>
-            <a:endParaRPr lang="en-US" dirty="0"/>
-          </a:p>
-          <a:p>
-            <a:r>
-              <a:rPr lang="en-US" dirty="0"/>
-              <a:t>We see that the rolling total amount of voter registrations (indicated by the orange bars) is nonlinear with time, oddly enough not reflecting the population growth trajectory of Texas per US Census estimates (Indicated by the gray line plot). It’s unclear why these two trends would be of a different functional form, but it may reflect artifacts generated by the way in which the Census estimates are derived, or perhaps reflect a large non-voting immigrant population and not have a deeper empirical meaning.</a:t>
+              <a:t>see that the rolling total amount of voter registrations (indicated by the orange bars) is nonlinear with time, oddly enough not reflecting the population growth trajectory of Texas per US Census estimates (Indicated by the gray line plot). It’s unclear why these two trends would be of a different functional form, but it may reflect artifacts generated by the way in which the Census estimates are derived, or perhaps reflect a large non-voting immigrant population and not have a deeper empirical meaning.</a:t>
             </a:r>
           </a:p>
         </p:txBody>
@@ -740,40 +714,7 @@
               </a:rPr>
               <a:t> distributions don’t change dramatically until we look at Unspecified: this group has a much different age distribution than the population, show a bimodal distribution with peaks at the 30 – 40 and 55 – 60 bins. This suggests that these age groups show a predilection towards withholding their gender information for some reason. To be fair, however, these are also roughly the Millennial and Baby Boomer group ages, which may mean that these peaks are merely representative of those groups’ large populations. However, if this were the full story, we’d expect to see a similar unfiltered distribution, but we don’t. The reasons behind this are unclear at this time.</a:t>
             </a:r>
-          </a:p>
-          <a:p>
-            <a:endParaRPr lang="en-US" sz="1200" b="0" i="0" u="none" strike="noStrike" kern="1200" dirty="0">
-              <a:solidFill>
-                <a:schemeClr val="tx1"/>
-              </a:solidFill>
-              <a:effectLst/>
-              <a:latin typeface="+mn-lt"/>
-              <a:ea typeface="+mn-ea"/>
-              <a:cs typeface="+mn-cs"/>
-            </a:endParaRPr>
-          </a:p>
-          <a:p>
-            <a:pPr marL="0" marR="0" lvl="0" indent="0" algn="l" defTabSz="914400" rtl="0" eaLnBrk="1" fontAlgn="auto" latinLnBrk="0" hangingPunct="1">
-              <a:lnSpc>
-                <a:spcPct val="100000"/>
-              </a:lnSpc>
-              <a:spcBef>
-                <a:spcPts val="0"/>
-              </a:spcBef>
-              <a:spcAft>
-                <a:spcPts val="0"/>
-              </a:spcAft>
-              <a:buClrTx/>
-              <a:buSzTx/>
-              <a:buFontTx/>
-              <a:buNone/>
-              <a:tabLst/>
-              <a:defRPr/>
-            </a:pPr>
-            <a:r>
-              <a:rPr lang="en-US" dirty="0"/>
-              <a:t>SKIP IN FINAL PRODUCT: The age distribution is nearly uniform with a long tail, which is not terribly surprising given known general mortality statistics. Note that we’ve limited our age range to be 18 to 123 years. There are some nonsensical birthdates given in the data that have voters as young as 2 and as old as 239. Since voters have to be 18 to register and the oldest age verified in a modern human is almost 123 years, I decided to limit the data to those values.</a:t>
-            </a:r>
+            <a:endParaRPr lang="en-US" dirty="0"/>
           </a:p>
         </p:txBody>
       </p:sp>
@@ -857,47 +798,18 @@
           <a:bodyPr/>
           <a:lstStyle/>
           <a:p>
-            <a:pPr marL="0" marR="0" lvl="0" indent="0" algn="l" defTabSz="914400" rtl="0" eaLnBrk="1" fontAlgn="auto" latinLnBrk="0" hangingPunct="1">
-              <a:lnSpc>
-                <a:spcPct val="100000"/>
-              </a:lnSpc>
-              <a:spcBef>
-                <a:spcPts val="0"/>
-              </a:spcBef>
-              <a:spcAft>
-                <a:spcPts val="0"/>
-              </a:spcAft>
-              <a:buClrTx/>
-              <a:buSzTx/>
-              <a:buFontTx/>
-              <a:buNone/>
-              <a:tabLst/>
-              <a:defRPr/>
-            </a:pPr>
             <a:r>
               <a:rPr lang="en-US" dirty="0"/>
-              <a:t>AGG STRATEGY: COUNT by EDR year</a:t>
+              <a:t>We clearly see a spike in voter registrations every election year, as indicated here, likely reflecting “get out the vote” efforts that ramp up during Presidential elections. We see smaller, but consistent, jumps in registrations during mid-term election years, with the lowest registrations during odd years. Also, we note that the last few election cycles since 2008 show substantially more voter registrations in the election year than in surrounding years, when compared to the historical data. It’s unclear why this might be, but perhaps is a reflection of modified tactics by the major political parties.</a:t>
             </a:r>
           </a:p>
           <a:p>
             <a:endParaRPr lang="en-US" dirty="0"/>
           </a:p>
           <a:p>
-            <a:endParaRPr lang="en-US" dirty="0"/>
-          </a:p>
-          <a:p>
             <a:r>
               <a:rPr lang="en-US" dirty="0"/>
-              <a:t>We clearly see a spike in voter registrations every election year, as indicated here, likely reflecting “get out the vote” efforts that ramp up during Presidential elections. Also, we note that the last few election cycles since 2008 show substantially more voter registrations in the election year than in surrounding years, when compared to the historical data. It’s unclear why this might be, but perhaps is a reflection of modified tactics by the major political parties.</a:t>
-            </a:r>
-          </a:p>
-          <a:p>
-            <a:endParaRPr lang="en-US" dirty="0"/>
-          </a:p>
-          <a:p>
-            <a:r>
-              <a:rPr lang="en-US" dirty="0"/>
-              <a:t>One measure, shown here, that seemed particularly interesting was the measure of years between turning 18 and actually registering to vote. The theory I had here was that, the further one was from 18 when registering, the more likely one was registering due to a concern about the upcoming election (either a desire to defend incumbents or to unseat them). It’s hard to discern much from this measure except for the behavior of the youngest age group, which is also consistently the dominant one (unsurprising, since presumably a majority of Americans register to vote when they turn 18). The odd behavior of this measure is clear however: even though we see spikes in overall registrations in Presidential election years, we for some reason see a corresponding drop in the youngest voters registering. This suggests that there is a sizeable influx of new registrants that are at least 5 years beyond their 18</a:t>
+              <a:t>One measure that seemed particularly interesting was the age of voters when they chose to register. The theory I had here was that, the further one was from 18 when registering, the more likely one was registering due to a concern about the upcoming election (either a desire to defend incumbents or to unseat them). It’s hard to discern much from this measure except for the behavior of the youngest age group, which is also consistently the dominant one (unsurprising, since presumably a majority of Americans register to vote when they turn 18). The odd behavior of this measure is clear however: even though we see spikes in overall registrations in Presidential election years, we for some reason see a corresponding drop in the percentage voters registering each year in the youngest groups. This suggests that there is a sizeable influx of new registrants that are at least 5 years beyond their 18</a:t>
             </a:r>
             <a:r>
               <a:rPr lang="en-US" baseline="30000" dirty="0"/>
@@ -1132,119 +1044,68 @@
           <a:bodyPr/>
           <a:lstStyle/>
           <a:p>
-            <a:pPr marL="0" marR="0" lvl="0" indent="0" algn="l" defTabSz="914400" rtl="0" eaLnBrk="1" fontAlgn="auto" latinLnBrk="0" hangingPunct="1">
-              <a:lnSpc>
-                <a:spcPct val="100000"/>
-              </a:lnSpc>
-              <a:spcBef>
-                <a:spcPts val="0"/>
-              </a:spcBef>
-              <a:spcAft>
-                <a:spcPts val="0"/>
-              </a:spcAft>
-              <a:buClrTx/>
-              <a:buSzTx/>
-              <a:buFontTx/>
-              <a:buNone/>
-              <a:tabLst/>
-              <a:defRPr/>
-            </a:pPr>
+            <a:r>
+              <a:rPr lang="en-US" b="1" dirty="0"/>
+              <a:t>MAP</a:t>
+            </a:r>
+          </a:p>
+          <a:p>
             <a:r>
               <a:rPr lang="en-US" dirty="0"/>
-              <a:t>AGG STRATEGY: COUNT by Perm ZIP, age, gender, status code (decreasing number of levels per categorical)</a:t>
-            </a:r>
-          </a:p>
-          <a:p>
-            <a:pPr marL="0" marR="0" lvl="0" indent="0" algn="l" defTabSz="914400" rtl="0" eaLnBrk="1" fontAlgn="auto" latinLnBrk="0" hangingPunct="1">
-              <a:lnSpc>
-                <a:spcPct val="100000"/>
-              </a:lnSpc>
-              <a:spcBef>
-                <a:spcPts val="0"/>
-              </a:spcBef>
-              <a:spcAft>
-                <a:spcPts val="0"/>
-              </a:spcAft>
-              <a:buClrTx/>
-              <a:buSzTx/>
-              <a:buFontTx/>
-              <a:buNone/>
-              <a:tabLst/>
-              <a:defRPr/>
-            </a:pPr>
+              <a:t>Note that we expect there to be a MAX of 552,805 people registered in a given Congressional district, but it appears that one district exceeds this (hence why the legend goes up to 1.0059). This is likely an artifact of the voting-age population estimate we used to determine the proper maximum number of possible voters in each Congressional district or one related to the geocoding limitations we’ve already observed in using the permanent ZIP codes of voters to determine where to locate the US Congressional districts. Also, when we filter by Active voter registrations only, we see that the maximum fraction drops to 0.8553, indicating that 15% of voters have a Suspended registration, 2% higher than the state-wide value of 13%. For some reason, this is the district with the highest fraction of Suspended voters relative to the total possible voting population. Voters can be suspended (mostly) if their address can’t be confirmed (e.g. they indicate they no longer live in their original county in response to a jury summons or their renewal certificate/registration confirmation is returned as undeliverable by the USPS). They can still vote, even when on the Suspense list, they just need to verify their identity and residence a little more deeply than the average voter. Still, it’s curious to see this prevalence of suspended voters in the district with the highest fraction of registered voters...</a:t>
+            </a:r>
+          </a:p>
+          <a:p>
             <a:endParaRPr lang="en-US" dirty="0"/>
           </a:p>
           <a:p>
-            <a:pPr marL="0" marR="0" lvl="0" indent="0" algn="l" defTabSz="914400" rtl="0" eaLnBrk="1" fontAlgn="auto" latinLnBrk="0" hangingPunct="1">
-              <a:lnSpc>
-                <a:spcPct val="100000"/>
-              </a:lnSpc>
-              <a:spcBef>
-                <a:spcPts val="0"/>
-              </a:spcBef>
-              <a:spcAft>
-                <a:spcPts val="0"/>
-              </a:spcAft>
-              <a:buClrTx/>
-              <a:buSzTx/>
-              <a:buFontTx/>
-              <a:buNone/>
-              <a:tabLst/>
-              <a:defRPr/>
-            </a:pPr>
-            <a:endParaRPr lang="en-US" dirty="0"/>
-          </a:p>
-          <a:p>
-            <a:pPr marL="0" marR="0" lvl="0" indent="0" algn="l" defTabSz="914400" rtl="0" eaLnBrk="1" fontAlgn="auto" latinLnBrk="0" hangingPunct="1">
-              <a:lnSpc>
-                <a:spcPct val="100000"/>
-              </a:lnSpc>
-              <a:spcBef>
-                <a:spcPts val="0"/>
-              </a:spcBef>
-              <a:spcAft>
-                <a:spcPts val="0"/>
-              </a:spcAft>
-              <a:buClrTx/>
-              <a:buSzTx/>
-              <a:buFontTx/>
-              <a:buNone/>
-              <a:tabLst/>
-              <a:defRPr/>
-            </a:pPr>
-            <a:endParaRPr lang="en-US" dirty="0"/>
-          </a:p>
-          <a:p>
-            <a:pPr marL="0" marR="0" lvl="0" indent="0" algn="l" defTabSz="914400" rtl="0" eaLnBrk="1" fontAlgn="auto" latinLnBrk="0" hangingPunct="1">
-              <a:lnSpc>
-                <a:spcPct val="100000"/>
-              </a:lnSpc>
-              <a:spcBef>
-                <a:spcPts val="0"/>
-              </a:spcBef>
-              <a:spcAft>
-                <a:spcPts val="0"/>
-              </a:spcAft>
-              <a:buClrTx/>
-              <a:buSzTx/>
-              <a:buFontTx/>
-              <a:buNone/>
-              <a:tabLst/>
-              <a:defRPr/>
-            </a:pPr>
-            <a:r>
-              <a:rPr lang="en-US" dirty="0"/>
-              <a:t>Still want a Selector that picks what the map coloring variable is (voter fraction of district population first)? New voter fraction approach for coloring may be sufficient, in addition the interactive filters</a:t>
-            </a:r>
-          </a:p>
-          <a:p>
-            <a:endParaRPr lang="en-US" dirty="0"/>
-          </a:p>
-          <a:p>
-            <a:r>
-              <a:rPr lang="en-US" dirty="0"/>
-              <a:t>Note that we expect there to be a MAX of 552,805 people registered in a given Congressional district</a:t>
-            </a:r>
+            <a:endParaRPr lang="en-US" b="1" dirty="0"/>
+          </a:p>
+          <a:p>
+            <a:r>
+              <a:rPr lang="en-US" b="1" dirty="0"/>
+              <a:t>Status Code</a:t>
+            </a:r>
+            <a:endParaRPr lang="en-US" b="0" dirty="0"/>
+          </a:p>
+          <a:p>
+            <a:r>
+              <a:rPr lang="en-US" b="0" dirty="0"/>
+              <a:t>We don’t see much of a change in our geographic distribution of registered voter fractions when filtering on only Active voters, which is unsurprising given how big of a share of the overall voter pool they represent. However, we do see a good bit of contrast across USC districts appear when looking at the Suspended group, suggesting that there may be value in targeting certain districts for voter registration confirmation campaigns: given that there is a higher barrier to voting for those on the Suspense list, getting those folks’ registrations confirmed and squared away is bound to engage a sizeable chunk of the electorate that may otherwise skip the elections at hand.</a:t>
+            </a:r>
+          </a:p>
+          <a:p>
+            <a:endParaRPr lang="en-US" b="0" dirty="0"/>
+          </a:p>
+          <a:p>
+            <a:r>
+              <a:rPr lang="en-US" b="1" dirty="0"/>
+              <a:t>Age</a:t>
+            </a:r>
+          </a:p>
+          <a:p>
+            <a:r>
+              <a:rPr lang="en-US" b="0" dirty="0"/>
+              <a:t>I will note here there is a clear bias towards younger ages in Suspended voters. Likely this is a reflection of younger people not being as settled in their permanent homes, moving around frequently and thus making it difficult to confirm their county of residence and keep them on the active voter list. This presents an opportunity for a voter turnout project: especially for younger voters, make sure to get multiple ways to contact them about keeping their registration active in future years (e.g. an email in addition to address). Also, this presents an opportunity for targeted educational efforts: when you see a young voter registering, take the time to offer them tips about how to keep their registration current going forward, so mail forwarding gets setup when they move to a new apartment, etc.</a:t>
+            </a:r>
+            <a:endParaRPr lang="en-US" b="1" dirty="0"/>
+          </a:p>
+          <a:p>
+            <a:endParaRPr lang="en-US" b="1" dirty="0"/>
+          </a:p>
+          <a:p>
+            <a:r>
+              <a:rPr lang="en-US" b="1" dirty="0"/>
+              <a:t>Gender</a:t>
+            </a:r>
+            <a:endParaRPr lang="en-US" b="0" dirty="0"/>
+          </a:p>
+          <a:p>
+            <a:r>
+              <a:rPr lang="en-US" b="0" dirty="0"/>
+              <a:t>We see no real difference in our distributions (geographically or otherwise) for men versus women, but we do see a significant change in both geographic dispersion of Unspecified gender voters and their age distribution. As mentioned earlier, I can’t readily explain why this age distribution is present, but it’s useful to note the geographic contrast we’re seeing. However, at the moment there seems to be no clear way to target Unspecified voters specifically.</a:t>
+            </a:r>
+            <a:endParaRPr lang="en-US" b="1" dirty="0"/>
           </a:p>
         </p:txBody>
       </p:sp>
@@ -4545,8 +4406,13 @@
         <p:spPr>
           <a:xfrm>
             <a:off x="838200" y="1825625"/>
-            <a:ext cx="10515600" cy="4351338"/>
+            <a:ext cx="10515600" cy="2226830"/>
           </a:xfrm>
+          <a:ln>
+            <a:solidFill>
+              <a:schemeClr val="accent1"/>
+            </a:solidFill>
+          </a:ln>
         </p:spPr>
         <p:txBody>
           <a:bodyPr/>
@@ -4565,7 +4431,7 @@
             <a:pPr lvl="1"/>
             <a:r>
               <a:rPr lang="en-US" dirty="0"/>
-              <a:t>15,531,103 registered voters: only 78% of the total 19,900,980 voting-age population in TX, estimated as of 2018. </a:t>
+              <a:t>15,525,281 registered voters: only 78% of the total 19,900,980 voting-age population in TX, estimated as of 2018, and not all of those registered are currently considered active!</a:t>
             </a:r>
           </a:p>
           <a:p>
@@ -4587,6 +4453,210 @@
               <a:buNone/>
             </a:pPr>
             <a:endParaRPr lang="en-US" dirty="0"/>
+          </a:p>
+        </p:txBody>
+      </p:sp>
+      <p:sp>
+        <p:nvSpPr>
+          <p:cNvPr id="4" name="Content Placeholder 2">
+            <a:extLst>
+              <a:ext uri="{FF2B5EF4-FFF2-40B4-BE49-F238E27FC236}">
+                <a16:creationId xmlns:a16="http://schemas.microsoft.com/office/drawing/2014/main" id="{1479B006-B6FC-6C48-A9D2-9877EB895A9A}"/>
+              </a:ext>
+            </a:extLst>
+          </p:cNvPr>
+          <p:cNvSpPr txBox="1">
+            <a:spLocks/>
+          </p:cNvSpPr>
+          <p:nvPr/>
+        </p:nvSpPr>
+        <p:spPr>
+          <a:xfrm>
+            <a:off x="838200" y="4343399"/>
+            <a:ext cx="10515600" cy="1935885"/>
+          </a:xfrm>
+          <a:prstGeom prst="rect">
+            <a:avLst/>
+          </a:prstGeom>
+          <a:ln>
+            <a:solidFill>
+              <a:schemeClr val="accent1"/>
+            </a:solidFill>
+          </a:ln>
+        </p:spPr>
+        <p:txBody>
+          <a:bodyPr vert="horz" lIns="91440" tIns="45720" rIns="91440" bIns="45720" rtlCol="0">
+            <a:normAutofit/>
+          </a:bodyPr>
+          <a:lstStyle>
+            <a:lvl1pPr marL="228600" indent="-228600" algn="l" defTabSz="914400" rtl="0" eaLnBrk="1" latinLnBrk="0" hangingPunct="1">
+              <a:lnSpc>
+                <a:spcPct val="90000"/>
+              </a:lnSpc>
+              <a:spcBef>
+                <a:spcPts val="1000"/>
+              </a:spcBef>
+              <a:buFont typeface="Arial" panose="020B0604020202020204" pitchFamily="34" charset="0"/>
+              <a:buChar char="•"/>
+              <a:defRPr sz="2800" kern="1200">
+                <a:solidFill>
+                  <a:schemeClr val="tx1"/>
+                </a:solidFill>
+                <a:latin typeface="+mn-lt"/>
+                <a:ea typeface="+mn-ea"/>
+                <a:cs typeface="+mn-cs"/>
+              </a:defRPr>
+            </a:lvl1pPr>
+            <a:lvl2pPr marL="685800" indent="-228600" algn="l" defTabSz="914400" rtl="0" eaLnBrk="1" latinLnBrk="0" hangingPunct="1">
+              <a:lnSpc>
+                <a:spcPct val="90000"/>
+              </a:lnSpc>
+              <a:spcBef>
+                <a:spcPts val="500"/>
+              </a:spcBef>
+              <a:buFont typeface="Arial" panose="020B0604020202020204" pitchFamily="34" charset="0"/>
+              <a:buChar char="•"/>
+              <a:defRPr sz="2400" kern="1200">
+                <a:solidFill>
+                  <a:schemeClr val="tx1"/>
+                </a:solidFill>
+                <a:latin typeface="+mn-lt"/>
+                <a:ea typeface="+mn-ea"/>
+                <a:cs typeface="+mn-cs"/>
+              </a:defRPr>
+            </a:lvl2pPr>
+            <a:lvl3pPr marL="1143000" indent="-228600" algn="l" defTabSz="914400" rtl="0" eaLnBrk="1" latinLnBrk="0" hangingPunct="1">
+              <a:lnSpc>
+                <a:spcPct val="90000"/>
+              </a:lnSpc>
+              <a:spcBef>
+                <a:spcPts val="500"/>
+              </a:spcBef>
+              <a:buFont typeface="Arial" panose="020B0604020202020204" pitchFamily="34" charset="0"/>
+              <a:buChar char="•"/>
+              <a:defRPr sz="2000" kern="1200">
+                <a:solidFill>
+                  <a:schemeClr val="tx1"/>
+                </a:solidFill>
+                <a:latin typeface="+mn-lt"/>
+                <a:ea typeface="+mn-ea"/>
+                <a:cs typeface="+mn-cs"/>
+              </a:defRPr>
+            </a:lvl3pPr>
+            <a:lvl4pPr marL="1600200" indent="-228600" algn="l" defTabSz="914400" rtl="0" eaLnBrk="1" latinLnBrk="0" hangingPunct="1">
+              <a:lnSpc>
+                <a:spcPct val="90000"/>
+              </a:lnSpc>
+              <a:spcBef>
+                <a:spcPts val="500"/>
+              </a:spcBef>
+              <a:buFont typeface="Arial" panose="020B0604020202020204" pitchFamily="34" charset="0"/>
+              <a:buChar char="•"/>
+              <a:defRPr sz="1800" kern="1200">
+                <a:solidFill>
+                  <a:schemeClr val="tx1"/>
+                </a:solidFill>
+                <a:latin typeface="+mn-lt"/>
+                <a:ea typeface="+mn-ea"/>
+                <a:cs typeface="+mn-cs"/>
+              </a:defRPr>
+            </a:lvl4pPr>
+            <a:lvl5pPr marL="2057400" indent="-228600" algn="l" defTabSz="914400" rtl="0" eaLnBrk="1" latinLnBrk="0" hangingPunct="1">
+              <a:lnSpc>
+                <a:spcPct val="90000"/>
+              </a:lnSpc>
+              <a:spcBef>
+                <a:spcPts val="500"/>
+              </a:spcBef>
+              <a:buFont typeface="Arial" panose="020B0604020202020204" pitchFamily="34" charset="0"/>
+              <a:buChar char="•"/>
+              <a:defRPr sz="1800" kern="1200">
+                <a:solidFill>
+                  <a:schemeClr val="tx1"/>
+                </a:solidFill>
+                <a:latin typeface="+mn-lt"/>
+                <a:ea typeface="+mn-ea"/>
+                <a:cs typeface="+mn-cs"/>
+              </a:defRPr>
+            </a:lvl5pPr>
+            <a:lvl6pPr marL="2514600" indent="-228600" algn="l" defTabSz="914400" rtl="0" eaLnBrk="1" latinLnBrk="0" hangingPunct="1">
+              <a:lnSpc>
+                <a:spcPct val="90000"/>
+              </a:lnSpc>
+              <a:spcBef>
+                <a:spcPts val="500"/>
+              </a:spcBef>
+              <a:buFont typeface="Arial" panose="020B0604020202020204" pitchFamily="34" charset="0"/>
+              <a:buChar char="•"/>
+              <a:defRPr sz="1800" kern="1200">
+                <a:solidFill>
+                  <a:schemeClr val="tx1"/>
+                </a:solidFill>
+                <a:latin typeface="+mn-lt"/>
+                <a:ea typeface="+mn-ea"/>
+                <a:cs typeface="+mn-cs"/>
+              </a:defRPr>
+            </a:lvl6pPr>
+            <a:lvl7pPr marL="2971800" indent="-228600" algn="l" defTabSz="914400" rtl="0" eaLnBrk="1" latinLnBrk="0" hangingPunct="1">
+              <a:lnSpc>
+                <a:spcPct val="90000"/>
+              </a:lnSpc>
+              <a:spcBef>
+                <a:spcPts val="500"/>
+              </a:spcBef>
+              <a:buFont typeface="Arial" panose="020B0604020202020204" pitchFamily="34" charset="0"/>
+              <a:buChar char="•"/>
+              <a:defRPr sz="1800" kern="1200">
+                <a:solidFill>
+                  <a:schemeClr val="tx1"/>
+                </a:solidFill>
+                <a:latin typeface="+mn-lt"/>
+                <a:ea typeface="+mn-ea"/>
+                <a:cs typeface="+mn-cs"/>
+              </a:defRPr>
+            </a:lvl7pPr>
+            <a:lvl8pPr marL="3429000" indent="-228600" algn="l" defTabSz="914400" rtl="0" eaLnBrk="1" latinLnBrk="0" hangingPunct="1">
+              <a:lnSpc>
+                <a:spcPct val="90000"/>
+              </a:lnSpc>
+              <a:spcBef>
+                <a:spcPts val="500"/>
+              </a:spcBef>
+              <a:buFont typeface="Arial" panose="020B0604020202020204" pitchFamily="34" charset="0"/>
+              <a:buChar char="•"/>
+              <a:defRPr sz="1800" kern="1200">
+                <a:solidFill>
+                  <a:schemeClr val="tx1"/>
+                </a:solidFill>
+                <a:latin typeface="+mn-lt"/>
+                <a:ea typeface="+mn-ea"/>
+                <a:cs typeface="+mn-cs"/>
+              </a:defRPr>
+            </a:lvl8pPr>
+            <a:lvl9pPr marL="3886200" indent="-228600" algn="l" defTabSz="914400" rtl="0" eaLnBrk="1" latinLnBrk="0" hangingPunct="1">
+              <a:lnSpc>
+                <a:spcPct val="90000"/>
+              </a:lnSpc>
+              <a:spcBef>
+                <a:spcPts val="500"/>
+              </a:spcBef>
+              <a:buFont typeface="Arial" panose="020B0604020202020204" pitchFamily="34" charset="0"/>
+              <a:buChar char="•"/>
+              <a:defRPr sz="1800" kern="1200">
+                <a:solidFill>
+                  <a:schemeClr val="tx1"/>
+                </a:solidFill>
+                <a:latin typeface="+mn-lt"/>
+                <a:ea typeface="+mn-ea"/>
+                <a:cs typeface="+mn-cs"/>
+              </a:defRPr>
+            </a:lvl9pPr>
+          </a:lstStyle>
+          <a:p>
+            <a:r>
+              <a:rPr lang="en-US" dirty="0"/>
+              <a:t>Image: SOS page cited above with current registered voter count and total possible voter population highlighted</a:t>
+            </a:r>
           </a:p>
         </p:txBody>
       </p:sp>
@@ -4669,6 +4739,11 @@
             <a:off x="1407824" y="1825599"/>
             <a:ext cx="4828083" cy="2431607"/>
           </a:xfrm>
+          <a:ln>
+            <a:solidFill>
+              <a:schemeClr val="accent1"/>
+            </a:solidFill>
+          </a:ln>
         </p:spPr>
         <p:txBody>
           <a:bodyPr>
@@ -4728,6 +4803,11 @@
           <a:prstGeom prst="rect">
             <a:avLst/>
           </a:prstGeom>
+          <a:ln>
+            <a:solidFill>
+              <a:schemeClr val="accent1"/>
+            </a:solidFill>
+          </a:ln>
         </p:spPr>
         <p:txBody>
           <a:bodyPr vert="horz" lIns="91440" tIns="45720" rIns="91440" bIns="45720" rtlCol="0">
@@ -4934,6 +5014,11 @@
           <a:prstGeom prst="rect">
             <a:avLst/>
           </a:prstGeom>
+          <a:ln>
+            <a:solidFill>
+              <a:schemeClr val="accent1"/>
+            </a:solidFill>
+          </a:ln>
         </p:spPr>
         <p:txBody>
           <a:bodyPr vert="horz" lIns="91440" tIns="45720" rIns="91440" bIns="45720" rtlCol="0">
@@ -5211,6 +5296,11 @@
             <a:off x="838200" y="5241744"/>
             <a:ext cx="3029262" cy="1022506"/>
           </a:xfrm>
+          <a:ln>
+            <a:solidFill>
+              <a:schemeClr val="accent1"/>
+            </a:solidFill>
+          </a:ln>
         </p:spPr>
         <p:txBody>
           <a:bodyPr/>
@@ -5245,6 +5335,11 @@
           <a:prstGeom prst="rect">
             <a:avLst/>
           </a:prstGeom>
+          <a:ln>
+            <a:solidFill>
+              <a:schemeClr val="accent1"/>
+            </a:solidFill>
+          </a:ln>
         </p:spPr>
         <p:txBody>
           <a:bodyPr vert="horz" lIns="91440" tIns="45720" rIns="91440" bIns="45720" rtlCol="0">
@@ -5444,6 +5539,11 @@
           <a:prstGeom prst="rect">
             <a:avLst/>
           </a:prstGeom>
+          <a:ln>
+            <a:solidFill>
+              <a:schemeClr val="accent1"/>
+            </a:solidFill>
+          </a:ln>
         </p:spPr>
         <p:txBody>
           <a:bodyPr vert="horz" lIns="91440" tIns="45720" rIns="91440" bIns="45720" rtlCol="0">
@@ -5674,7 +5774,7 @@
           <a:p>
             <a:r>
               <a:rPr lang="en-US" dirty="0"/>
-              <a:t>Numbers of Voters by Texas Precinct and US Congressional District</a:t>
+              <a:t>Numbers of Voters by US Congressional District</a:t>
             </a:r>
           </a:p>
         </p:txBody>
@@ -5701,6 +5801,11 @@
           <a:prstGeom prst="rect">
             <a:avLst/>
           </a:prstGeom>
+          <a:ln>
+            <a:solidFill>
+              <a:schemeClr val="accent1"/>
+            </a:solidFill>
+          </a:ln>
         </p:spPr>
         <p:txBody>
           <a:bodyPr vert="horz" lIns="91440" tIns="45720" rIns="91440" bIns="45720" rtlCol="0">
@@ -5900,6 +6005,11 @@
           <a:prstGeom prst="rect">
             <a:avLst/>
           </a:prstGeom>
+          <a:ln>
+            <a:solidFill>
+              <a:schemeClr val="accent1"/>
+            </a:solidFill>
+          </a:ln>
         </p:spPr>
         <p:txBody>
           <a:bodyPr vert="horz" lIns="91440" tIns="45720" rIns="91440" bIns="45720" rtlCol="0">
@@ -6099,6 +6209,11 @@
           <a:prstGeom prst="rect">
             <a:avLst/>
           </a:prstGeom>
+          <a:ln>
+            <a:solidFill>
+              <a:schemeClr val="accent1"/>
+            </a:solidFill>
+          </a:ln>
         </p:spPr>
         <p:txBody>
           <a:bodyPr vert="horz" lIns="91440" tIns="45720" rIns="91440" bIns="45720" rtlCol="0">
@@ -6355,6 +6470,11 @@
             <a:off x="838200" y="1825624"/>
             <a:ext cx="10515600" cy="2206729"/>
           </a:xfrm>
+          <a:ln>
+            <a:solidFill>
+              <a:schemeClr val="accent1"/>
+            </a:solidFill>
+          </a:ln>
         </p:spPr>
         <p:txBody>
           <a:bodyPr>
@@ -6410,6 +6530,11 @@
           <a:prstGeom prst="rect">
             <a:avLst/>
           </a:prstGeom>
+          <a:ln>
+            <a:solidFill>
+              <a:schemeClr val="accent1"/>
+            </a:solidFill>
+          </a:ln>
         </p:spPr>
         <p:txBody>
           <a:bodyPr vert="horz" lIns="91440" tIns="45720" rIns="91440" bIns="45720" rtlCol="0">
@@ -6610,6 +6735,11 @@
           <a:prstGeom prst="rect">
             <a:avLst/>
           </a:prstGeom>
+          <a:ln>
+            <a:solidFill>
+              <a:schemeClr val="accent1"/>
+            </a:solidFill>
+          </a:ln>
         </p:spPr>
         <p:txBody>
           <a:bodyPr vert="horz" lIns="91440" tIns="45720" rIns="91440" bIns="45720" rtlCol="0">
@@ -6810,6 +6940,11 @@
           <a:prstGeom prst="rect">
             <a:avLst/>
           </a:prstGeom>
+          <a:ln>
+            <a:solidFill>
+              <a:schemeClr val="accent1"/>
+            </a:solidFill>
+          </a:ln>
         </p:spPr>
         <p:txBody>
           <a:bodyPr vert="horz" lIns="91440" tIns="45720" rIns="91440" bIns="45720" rtlCol="0">
@@ -6992,89 +7127,6 @@
     <p:extLst>
       <p:ext uri="{BB962C8B-B14F-4D97-AF65-F5344CB8AC3E}">
         <p14:creationId xmlns:p14="http://schemas.microsoft.com/office/powerpoint/2010/main" val="2342308355"/>
-      </p:ext>
-    </p:extLst>
-  </p:cSld>
-  <p:clrMapOvr>
-    <a:masterClrMapping/>
-  </p:clrMapOvr>
-</p:sld>
-</file>
-
-<file path=ppt/slides/slide6.xml><?xml version="1.0" encoding="utf-8"?>
-<p:sld xmlns:a="http://schemas.openxmlformats.org/drawingml/2006/main" xmlns:r="http://schemas.openxmlformats.org/officeDocument/2006/relationships" xmlns:p="http://schemas.openxmlformats.org/presentationml/2006/main">
-  <p:cSld>
-    <p:spTree>
-      <p:nvGrpSpPr>
-        <p:cNvPr id="1" name=""/>
-        <p:cNvGrpSpPr/>
-        <p:nvPr/>
-      </p:nvGrpSpPr>
-      <p:grpSpPr>
-        <a:xfrm>
-          <a:off x="0" y="0"/>
-          <a:ext cx="0" cy="0"/>
-          <a:chOff x="0" y="0"/>
-          <a:chExt cx="0" cy="0"/>
-        </a:xfrm>
-      </p:grpSpPr>
-      <p:sp>
-        <p:nvSpPr>
-          <p:cNvPr id="2" name="Title 1">
-            <a:extLst>
-              <a:ext uri="{FF2B5EF4-FFF2-40B4-BE49-F238E27FC236}">
-                <a16:creationId xmlns:a16="http://schemas.microsoft.com/office/drawing/2014/main" id="{7775330E-0113-8949-9178-316F9AD3DFE3}"/>
-              </a:ext>
-            </a:extLst>
-          </p:cNvPr>
-          <p:cNvSpPr>
-            <a:spLocks noGrp="1"/>
-          </p:cNvSpPr>
-          <p:nvPr>
-            <p:ph type="title"/>
-          </p:nvPr>
-        </p:nvSpPr>
-        <p:spPr/>
-        <p:txBody>
-          <a:bodyPr/>
-          <a:lstStyle/>
-          <a:p>
-            <a:r>
-              <a:rPr lang="en-US" dirty="0"/>
-              <a:t>Anything new learned from preceding slides?</a:t>
-            </a:r>
-          </a:p>
-        </p:txBody>
-      </p:sp>
-      <p:sp>
-        <p:nvSpPr>
-          <p:cNvPr id="3" name="Content Placeholder 2">
-            <a:extLst>
-              <a:ext uri="{FF2B5EF4-FFF2-40B4-BE49-F238E27FC236}">
-                <a16:creationId xmlns:a16="http://schemas.microsoft.com/office/drawing/2014/main" id="{E4CAF602-68BA-5C4C-8F33-72336411F1A7}"/>
-              </a:ext>
-            </a:extLst>
-          </p:cNvPr>
-          <p:cNvSpPr>
-            <a:spLocks noGrp="1"/>
-          </p:cNvSpPr>
-          <p:nvPr>
-            <p:ph idx="1"/>
-          </p:nvPr>
-        </p:nvSpPr>
-        <p:spPr/>
-        <p:txBody>
-          <a:bodyPr/>
-          <a:lstStyle/>
-          <a:p>
-            <a:endParaRPr lang="en-US"/>
-          </a:p>
-        </p:txBody>
-      </p:sp>
-    </p:spTree>
-    <p:extLst>
-      <p:ext uri="{BB962C8B-B14F-4D97-AF65-F5344CB8AC3E}">
-        <p14:creationId xmlns:p14="http://schemas.microsoft.com/office/powerpoint/2010/main" val="763675951"/>
       </p:ext>
     </p:extLst>
   </p:cSld>

</xml_diff>